<commit_message>
update Generalization.. article summary
</commit_message>
<xml_diff>
--- a/articles/BGU_bio_medical_articles/Generalization of Deep Learning Gesture Classification in Robotic-Assisted Surgical Data - From Dry Lab to Clinical-Like Data/summary.pptx
+++ b/articles/BGU_bio_medical_articles/Generalization of Deep Learning Gesture Classification in Robotic-Assisted Surgical Data - From Dry Lab to Clinical-Like Data/summary.pptx
@@ -5,7 +5,7 @@
     <p:sldMasterId id="2147483714" r:id="rId1"/>
   </p:sldMasterIdLst>
   <p:notesMasterIdLst>
-    <p:notesMasterId r:id="rId19"/>
+    <p:notesMasterId r:id="rId17"/>
   </p:notesMasterIdLst>
   <p:sldIdLst>
     <p:sldId id="264" r:id="rId2"/>
@@ -15,16 +15,14 @@
     <p:sldId id="273" r:id="rId6"/>
     <p:sldId id="267" r:id="rId7"/>
     <p:sldId id="258" r:id="rId8"/>
-    <p:sldId id="270" r:id="rId9"/>
-    <p:sldId id="271" r:id="rId10"/>
-    <p:sldId id="275" r:id="rId11"/>
-    <p:sldId id="282" r:id="rId12"/>
-    <p:sldId id="281" r:id="rId13"/>
-    <p:sldId id="261" r:id="rId14"/>
-    <p:sldId id="276" r:id="rId15"/>
-    <p:sldId id="283" r:id="rId16"/>
-    <p:sldId id="284" r:id="rId17"/>
-    <p:sldId id="285" r:id="rId18"/>
+    <p:sldId id="275" r:id="rId9"/>
+    <p:sldId id="282" r:id="rId10"/>
+    <p:sldId id="281" r:id="rId11"/>
+    <p:sldId id="261" r:id="rId12"/>
+    <p:sldId id="276" r:id="rId13"/>
+    <p:sldId id="283" r:id="rId14"/>
+    <p:sldId id="284" r:id="rId15"/>
+    <p:sldId id="285" r:id="rId16"/>
   </p:sldIdLst>
   <p:sldSz cx="12192000" cy="6858000"/>
   <p:notesSz cx="6858000" cy="9144000"/>
@@ -213,7 +211,7 @@
           <a:p>
             <a:fld id="{989ABA17-4FED-4F6B-91C4-30EADC9C073D}" type="datetimeFigureOut">
               <a:rPr lang="he-IL" smtClean="0"/>
-              <a:t>כ"ח/שבט/תשפ"ה</a:t>
+              <a:t>ה'/אדר/תשפ"ה</a:t>
             </a:fld>
             <a:endParaRPr lang="he-IL"/>
           </a:p>
@@ -546,7 +544,7 @@
           <a:p>
             <a:fld id="{51796F53-5910-42B6-ACE3-1497F8F35664}" type="slidenum">
               <a:rPr lang="he-IL" smtClean="0"/>
-              <a:t>14</a:t>
+              <a:t>12</a:t>
             </a:fld>
             <a:endParaRPr lang="he-IL"/>
           </a:p>
@@ -714,7 +712,7 @@
           <a:p>
             <a:fld id="{BA5AFC3E-1EDF-432A-BA27-E6F9B0B947B9}" type="datetimeFigureOut">
               <a:rPr lang="he-IL" smtClean="0"/>
-              <a:t>כ"ח/שבט/תשפ"ה</a:t>
+              <a:t>ה'/אדר/תשפ"ה</a:t>
             </a:fld>
             <a:endParaRPr lang="he-IL"/>
           </a:p>
@@ -914,7 +912,7 @@
           <a:p>
             <a:fld id="{BA5AFC3E-1EDF-432A-BA27-E6F9B0B947B9}" type="datetimeFigureOut">
               <a:rPr lang="he-IL" smtClean="0"/>
-              <a:t>כ"ח/שבט/תשפ"ה</a:t>
+              <a:t>ה'/אדר/תשפ"ה</a:t>
             </a:fld>
             <a:endParaRPr lang="he-IL"/>
           </a:p>
@@ -1124,7 +1122,7 @@
           <a:p>
             <a:fld id="{BA5AFC3E-1EDF-432A-BA27-E6F9B0B947B9}" type="datetimeFigureOut">
               <a:rPr lang="he-IL" smtClean="0"/>
-              <a:t>כ"ח/שבט/תשפ"ה</a:t>
+              <a:t>ה'/אדר/תשפ"ה</a:t>
             </a:fld>
             <a:endParaRPr lang="he-IL"/>
           </a:p>
@@ -1324,7 +1322,7 @@
           <a:p>
             <a:fld id="{BA5AFC3E-1EDF-432A-BA27-E6F9B0B947B9}" type="datetimeFigureOut">
               <a:rPr lang="he-IL" smtClean="0"/>
-              <a:t>כ"ח/שבט/תשפ"ה</a:t>
+              <a:t>ה'/אדר/תשפ"ה</a:t>
             </a:fld>
             <a:endParaRPr lang="he-IL"/>
           </a:p>
@@ -1600,7 +1598,7 @@
           <a:p>
             <a:fld id="{BA5AFC3E-1EDF-432A-BA27-E6F9B0B947B9}" type="datetimeFigureOut">
               <a:rPr lang="he-IL" smtClean="0"/>
-              <a:t>כ"ח/שבט/תשפ"ה</a:t>
+              <a:t>ה'/אדר/תשפ"ה</a:t>
             </a:fld>
             <a:endParaRPr lang="he-IL"/>
           </a:p>
@@ -1868,7 +1866,7 @@
           <a:p>
             <a:fld id="{BA5AFC3E-1EDF-432A-BA27-E6F9B0B947B9}" type="datetimeFigureOut">
               <a:rPr lang="he-IL" smtClean="0"/>
-              <a:t>כ"ח/שבט/תשפ"ה</a:t>
+              <a:t>ה'/אדר/תשפ"ה</a:t>
             </a:fld>
             <a:endParaRPr lang="he-IL"/>
           </a:p>
@@ -2283,7 +2281,7 @@
           <a:p>
             <a:fld id="{BA5AFC3E-1EDF-432A-BA27-E6F9B0B947B9}" type="datetimeFigureOut">
               <a:rPr lang="he-IL" smtClean="0"/>
-              <a:t>כ"ח/שבט/תשפ"ה</a:t>
+              <a:t>ה'/אדר/תשפ"ה</a:t>
             </a:fld>
             <a:endParaRPr lang="he-IL"/>
           </a:p>
@@ -2425,7 +2423,7 @@
           <a:p>
             <a:fld id="{BA5AFC3E-1EDF-432A-BA27-E6F9B0B947B9}" type="datetimeFigureOut">
               <a:rPr lang="he-IL" smtClean="0"/>
-              <a:t>כ"ח/שבט/תשפ"ה</a:t>
+              <a:t>ה'/אדר/תשפ"ה</a:t>
             </a:fld>
             <a:endParaRPr lang="he-IL"/>
           </a:p>
@@ -2538,7 +2536,7 @@
           <a:p>
             <a:fld id="{BA5AFC3E-1EDF-432A-BA27-E6F9B0B947B9}" type="datetimeFigureOut">
               <a:rPr lang="he-IL" smtClean="0"/>
-              <a:t>כ"ח/שבט/תשפ"ה</a:t>
+              <a:t>ה'/אדר/תשפ"ה</a:t>
             </a:fld>
             <a:endParaRPr lang="he-IL"/>
           </a:p>
@@ -2851,7 +2849,7 @@
           <a:p>
             <a:fld id="{BA5AFC3E-1EDF-432A-BA27-E6F9B0B947B9}" type="datetimeFigureOut">
               <a:rPr lang="he-IL" smtClean="0"/>
-              <a:t>כ"ח/שבט/תשפ"ה</a:t>
+              <a:t>ה'/אדר/תשפ"ה</a:t>
             </a:fld>
             <a:endParaRPr lang="he-IL"/>
           </a:p>
@@ -3140,7 +3138,7 @@
           <a:p>
             <a:fld id="{BA5AFC3E-1EDF-432A-BA27-E6F9B0B947B9}" type="datetimeFigureOut">
               <a:rPr lang="he-IL" smtClean="0"/>
-              <a:t>כ"ח/שבט/תשפ"ה</a:t>
+              <a:t>ה'/אדר/תשפ"ה</a:t>
             </a:fld>
             <a:endParaRPr lang="he-IL"/>
           </a:p>
@@ -3383,7 +3381,7 @@
           <a:p>
             <a:fld id="{BA5AFC3E-1EDF-432A-BA27-E6F9B0B947B9}" type="datetimeFigureOut">
               <a:rPr lang="he-IL" smtClean="0"/>
-              <a:t>כ"ח/שבט/תשפ"ה</a:t>
+              <a:t>ה'/אדר/תשפ"ה</a:t>
             </a:fld>
             <a:endParaRPr lang="he-IL"/>
           </a:p>
@@ -3874,157 +3872,6 @@
         <p:cNvPr id="1" name="">
           <a:extLst>
             <a:ext uri="{FF2B5EF4-FFF2-40B4-BE49-F238E27FC236}">
-              <a16:creationId xmlns:a16="http://schemas.microsoft.com/office/drawing/2014/main" id="{884AD2E3-F83B-D8AD-E805-81FBE07D4320}"/>
-            </a:ext>
-          </a:extLst>
-        </p:cNvPr>
-        <p:cNvGrpSpPr/>
-        <p:nvPr/>
-      </p:nvGrpSpPr>
-      <p:grpSpPr>
-        <a:xfrm>
-          <a:off x="0" y="0"/>
-          <a:ext cx="0" cy="0"/>
-          <a:chOff x="0" y="0"/>
-          <a:chExt cx="0" cy="0"/>
-        </a:xfrm>
-      </p:grpSpPr>
-      <p:sp>
-        <p:nvSpPr>
-          <p:cNvPr id="2" name="Title 1">
-            <a:extLst>
-              <a:ext uri="{FF2B5EF4-FFF2-40B4-BE49-F238E27FC236}">
-                <a16:creationId xmlns:a16="http://schemas.microsoft.com/office/drawing/2014/main" id="{9CD1D636-F0A9-F33F-40C0-4FF499D323A7}"/>
-              </a:ext>
-            </a:extLst>
-          </p:cNvPr>
-          <p:cNvSpPr>
-            <a:spLocks noGrp="1"/>
-          </p:cNvSpPr>
-          <p:nvPr>
-            <p:ph type="ctrTitle"/>
-          </p:nvPr>
-        </p:nvSpPr>
-        <p:spPr>
-          <a:xfrm>
-            <a:off x="1524000" y="3075781"/>
-            <a:ext cx="9144000" cy="706437"/>
-          </a:xfrm>
-        </p:spPr>
-        <p:txBody>
-          <a:bodyPr>
-            <a:noAutofit/>
-          </a:bodyPr>
-          <a:lstStyle/>
-          <a:p>
-            <a:r>
-              <a:rPr lang="en-US" sz="5400" dirty="0">
-                <a:solidFill>
-                  <a:schemeClr val="bg1"/>
-                </a:solidFill>
-              </a:rPr>
-              <a:t>Model</a:t>
-            </a:r>
-            <a:endParaRPr lang="he-IL" sz="34400" dirty="0">
-              <a:solidFill>
-                <a:schemeClr val="bg1"/>
-              </a:solidFill>
-            </a:endParaRPr>
-          </a:p>
-        </p:txBody>
-      </p:sp>
-    </p:spTree>
-    <p:extLst>
-      <p:ext uri="{BB962C8B-B14F-4D97-AF65-F5344CB8AC3E}">
-        <p14:creationId xmlns:p14="http://schemas.microsoft.com/office/powerpoint/2010/main" val="1916833066"/>
-      </p:ext>
-    </p:extLst>
-  </p:cSld>
-  <p:clrMapOvr>
-    <a:masterClrMapping/>
-  </p:clrMapOvr>
-</p:sld>
-</file>
-
-<file path=ppt/slides/slide11.xml><?xml version="1.0" encoding="utf-8"?>
-<p:sld xmlns:a="http://schemas.openxmlformats.org/drawingml/2006/main" xmlns:r="http://schemas.openxmlformats.org/officeDocument/2006/relationships" xmlns:p="http://schemas.openxmlformats.org/presentationml/2006/main">
-  <p:cSld>
-    <p:spTree>
-      <p:nvGrpSpPr>
-        <p:cNvPr id="1" name=""/>
-        <p:cNvGrpSpPr/>
-        <p:nvPr/>
-      </p:nvGrpSpPr>
-      <p:grpSpPr>
-        <a:xfrm>
-          <a:off x="0" y="0"/>
-          <a:ext cx="0" cy="0"/>
-          <a:chOff x="0" y="0"/>
-          <a:chExt cx="0" cy="0"/>
-        </a:xfrm>
-      </p:grpSpPr>
-      <p:pic>
-        <p:nvPicPr>
-          <p:cNvPr id="4" name="Picture 3">
-            <a:extLst>
-              <a:ext uri="{FF2B5EF4-FFF2-40B4-BE49-F238E27FC236}">
-                <a16:creationId xmlns:a16="http://schemas.microsoft.com/office/drawing/2014/main" id="{9B09861D-FF73-DFDA-BAC5-CAB5EDA9E854}"/>
-              </a:ext>
-            </a:extLst>
-          </p:cNvPr>
-          <p:cNvPicPr>
-            <a:picLocks noChangeAspect="1"/>
-          </p:cNvPicPr>
-          <p:nvPr/>
-        </p:nvPicPr>
-        <p:blipFill>
-          <a:blip r:embed="rId2"/>
-          <a:stretch>
-            <a:fillRect/>
-          </a:stretch>
-        </p:blipFill>
-        <p:spPr>
-          <a:xfrm>
-            <a:off x="572036" y="1582676"/>
-            <a:ext cx="10859565" cy="3000340"/>
-          </a:xfrm>
-          <a:prstGeom prst="rect">
-            <a:avLst/>
-          </a:prstGeom>
-        </p:spPr>
-      </p:pic>
-    </p:spTree>
-    <p:extLst>
-      <p:ext uri="{BB962C8B-B14F-4D97-AF65-F5344CB8AC3E}">
-        <p14:creationId xmlns:p14="http://schemas.microsoft.com/office/powerpoint/2010/main" val="2364506096"/>
-      </p:ext>
-    </p:extLst>
-  </p:cSld>
-  <p:clrMapOvr>
-    <a:masterClrMapping/>
-  </p:clrMapOvr>
-</p:sld>
-</file>
-
-<file path=ppt/slides/slide12.xml><?xml version="1.0" encoding="utf-8"?>
-<p:sld xmlns:a="http://schemas.openxmlformats.org/drawingml/2006/main" xmlns:r="http://schemas.openxmlformats.org/officeDocument/2006/relationships" xmlns:p="http://schemas.openxmlformats.org/presentationml/2006/main">
-  <p:cSld>
-    <p:bg>
-      <p:bgPr>
-        <a:solidFill>
-          <a:schemeClr val="tx1">
-            <a:lumMod val="95000"/>
-            <a:lumOff val="5000"/>
-          </a:schemeClr>
-        </a:solidFill>
-        <a:effectLst/>
-      </p:bgPr>
-    </p:bg>
-    <p:spTree>
-      <p:nvGrpSpPr>
-        <p:cNvPr id="1" name="">
-          <a:extLst>
-            <a:ext uri="{FF2B5EF4-FFF2-40B4-BE49-F238E27FC236}">
               <a16:creationId xmlns:a16="http://schemas.microsoft.com/office/drawing/2014/main" id="{A32DD0A8-8985-0BD3-D9CE-B64647BA4D50}"/>
             </a:ext>
           </a:extLst>
@@ -4097,7 +3944,7 @@
 </p:sld>
 </file>
 
-<file path=ppt/slides/slide13.xml><?xml version="1.0" encoding="utf-8"?>
+<file path=ppt/slides/slide11.xml><?xml version="1.0" encoding="utf-8"?>
 <p:sld xmlns:a="http://schemas.openxmlformats.org/drawingml/2006/main" xmlns:r="http://schemas.openxmlformats.org/officeDocument/2006/relationships" xmlns:p="http://schemas.openxmlformats.org/presentationml/2006/main">
   <p:cSld>
     <p:spTree>
@@ -4446,7 +4293,7 @@
 </p:sld>
 </file>
 
-<file path=ppt/slides/slide14.xml><?xml version="1.0" encoding="utf-8"?>
+<file path=ppt/slides/slide12.xml><?xml version="1.0" encoding="utf-8"?>
 <p:sld xmlns:a="http://schemas.openxmlformats.org/drawingml/2006/main" xmlns:r="http://schemas.openxmlformats.org/officeDocument/2006/relationships" xmlns:p="http://schemas.openxmlformats.org/presentationml/2006/main">
   <p:cSld>
     <p:spTree>
@@ -4650,7 +4497,7 @@
 </p:sld>
 </file>
 
-<file path=ppt/slides/slide15.xml><?xml version="1.0" encoding="utf-8"?>
+<file path=ppt/slides/slide13.xml><?xml version="1.0" encoding="utf-8"?>
 <p:sld xmlns:a="http://schemas.openxmlformats.org/drawingml/2006/main" xmlns:r="http://schemas.openxmlformats.org/officeDocument/2006/relationships" xmlns:p="http://schemas.openxmlformats.org/presentationml/2006/main">
   <p:cSld>
     <p:spTree>
@@ -5061,7 +4908,7 @@
 </p:sld>
 </file>
 
-<file path=ppt/slides/slide16.xml><?xml version="1.0" encoding="utf-8"?>
+<file path=ppt/slides/slide14.xml><?xml version="1.0" encoding="utf-8"?>
 <p:sld xmlns:a="http://schemas.openxmlformats.org/drawingml/2006/main" xmlns:r="http://schemas.openxmlformats.org/officeDocument/2006/relationships" xmlns:p="http://schemas.openxmlformats.org/presentationml/2006/main">
   <p:cSld>
     <p:spTree>
@@ -5472,7 +5319,7 @@
 </p:sld>
 </file>
 
-<file path=ppt/slides/slide17.xml><?xml version="1.0" encoding="utf-8"?>
+<file path=ppt/slides/slide15.xml><?xml version="1.0" encoding="utf-8"?>
 <p:sld xmlns:a="http://schemas.openxmlformats.org/drawingml/2006/main" xmlns:r="http://schemas.openxmlformats.org/officeDocument/2006/relationships" xmlns:p="http://schemas.openxmlformats.org/presentationml/2006/main">
   <p:cSld>
     <p:spTree>
@@ -6468,7 +6315,7 @@
           <a:p>
             <a:r>
               <a:rPr lang="en-US" dirty="0"/>
-              <a:t>The contribution of their work is a guideline of how to </a:t>
+              <a:t>The contribution of this work is a guideline of how to </a:t>
             </a:r>
             <a:r>
               <a:rPr lang="en-US" b="1" dirty="0"/>
@@ -6490,7 +6337,7 @@
           <a:p>
             <a:r>
               <a:rPr lang="en-US" dirty="0"/>
-              <a:t>They unsuccessfully attempted to improve performance using several common techniques, such as data augmentation and transfer learning. In contrast, they demonstrate that using the same network architecture together with additional features and training on even a small clinical-like dataset leads to promising classification performance.</a:t>
+              <a:t>This work unsuccessfully attempted to improve performance using several common techniques, such as data augmentation and transfer learning. In contrast, they demonstrate that using the same network architecture together with additional features and training on even a small clinical-like dataset leads to promising classification performance.</a:t>
             </a:r>
           </a:p>
         </p:txBody>
@@ -6618,24 +6465,24 @@
       </p:grpSpPr>
       <p:sp>
         <p:nvSpPr>
-          <p:cNvPr id="2" name="Title 1">
-            <a:extLst>
-              <a:ext uri="{FF2B5EF4-FFF2-40B4-BE49-F238E27FC236}">
-                <a16:creationId xmlns:a16="http://schemas.microsoft.com/office/drawing/2014/main" id="{2DFB6840-338E-5874-F3D3-198C3BB5C40D}"/>
-              </a:ext>
-            </a:extLst>
-          </p:cNvPr>
-          <p:cNvSpPr>
-            <a:spLocks noGrp="1"/>
-          </p:cNvSpPr>
-          <p:nvPr>
-            <p:ph type="title"/>
+          <p:cNvPr id="4" name="Content Placeholder 2">
+            <a:extLst>
+              <a:ext uri="{FF2B5EF4-FFF2-40B4-BE49-F238E27FC236}">
+                <a16:creationId xmlns:a16="http://schemas.microsoft.com/office/drawing/2014/main" id="{0A94C119-2FE7-DFD4-0B3D-5E5EFC3E3602}"/>
+              </a:ext>
+            </a:extLst>
+          </p:cNvPr>
+          <p:cNvSpPr>
+            <a:spLocks noGrp="1"/>
+          </p:cNvSpPr>
+          <p:nvPr>
+            <p:ph idx="1"/>
           </p:nvPr>
         </p:nvSpPr>
         <p:spPr>
           <a:xfrm>
-            <a:off x="4539343" y="2564039"/>
-            <a:ext cx="2950028" cy="1325563"/>
+            <a:off x="838200" y="672287"/>
+            <a:ext cx="10515600" cy="5859142"/>
           </a:xfrm>
         </p:spPr>
         <p:txBody>
@@ -6645,10 +6492,99 @@
           <a:lstStyle/>
           <a:p>
             <a:r>
-              <a:rPr lang="en-US" sz="2800" b="1" dirty="0"/>
-              <a:t>JIGSAWS dataset</a:t>
-            </a:r>
-            <a:endParaRPr lang="he-IL" sz="2800" dirty="0"/>
+              <a:rPr lang="en-US" dirty="0"/>
+              <a:t>JIGSAWS:</a:t>
+            </a:r>
+          </a:p>
+          <a:p>
+            <a:pPr lvl="1"/>
+            <a:r>
+              <a:rPr lang="en-US" dirty="0"/>
+              <a:t>Trials 104</a:t>
+            </a:r>
+          </a:p>
+          <a:p>
+            <a:pPr lvl="1"/>
+            <a:r>
+              <a:rPr lang="en-US" dirty="0"/>
+              <a:t>suturing, knot-tying, needle-passing</a:t>
+            </a:r>
+          </a:p>
+          <a:p>
+            <a:pPr lvl="1"/>
+            <a:r>
+              <a:rPr lang="en-US" dirty="0"/>
+              <a:t>Lab </a:t>
+            </a:r>
+          </a:p>
+          <a:p>
+            <a:pPr lvl="1"/>
+            <a:r>
+              <a:rPr lang="en-US" dirty="0"/>
+              <a:t>kinematic and video data.</a:t>
+            </a:r>
+          </a:p>
+          <a:p>
+            <a:r>
+              <a:rPr lang="en-US" dirty="0"/>
+              <a:t>BGU Biomedical Robotics (BBR) :</a:t>
+            </a:r>
+          </a:p>
+          <a:p>
+            <a:pPr lvl="1"/>
+            <a:r>
+              <a:rPr lang="en-US" dirty="0"/>
+              <a:t>86 trials, include rotating plate.</a:t>
+            </a:r>
+          </a:p>
+          <a:p>
+            <a:pPr lvl="1"/>
+            <a:r>
+              <a:rPr lang="en-US" dirty="0"/>
+              <a:t>suturing, knot-tying </a:t>
+            </a:r>
+          </a:p>
+          <a:p>
+            <a:pPr lvl="1"/>
+            <a:r>
+              <a:rPr lang="en-US" dirty="0"/>
+              <a:t>kinematic and video data</a:t>
+            </a:r>
+          </a:p>
+          <a:p>
+            <a:r>
+              <a:rPr lang="en-US" dirty="0"/>
+              <a:t>clinical-like dataset	</a:t>
+            </a:r>
+          </a:p>
+          <a:p>
+            <a:pPr lvl="1"/>
+            <a:r>
+              <a:rPr lang="en-US" dirty="0"/>
+              <a:t>Trials 104</a:t>
+            </a:r>
+          </a:p>
+          <a:p>
+            <a:pPr lvl="1"/>
+            <a:r>
+              <a:rPr lang="en-US" dirty="0"/>
+              <a:t>suturing, knot-tying </a:t>
+            </a:r>
+          </a:p>
+          <a:p>
+            <a:pPr lvl="1"/>
+            <a:r>
+              <a:rPr lang="en-US" dirty="0"/>
+              <a:t>kinematic and video data</a:t>
+            </a:r>
+          </a:p>
+          <a:p>
+            <a:pPr lvl="1"/>
+            <a:endParaRPr lang="en-US" dirty="0"/>
+          </a:p>
+          <a:p>
+            <a:pPr lvl="1"/>
+            <a:endParaRPr lang="he-IL" dirty="0"/>
           </a:p>
         </p:txBody>
       </p:sp>
@@ -6668,12 +6604,23 @@
 <file path=ppt/slides/slide8.xml><?xml version="1.0" encoding="utf-8"?>
 <p:sld xmlns:a="http://schemas.openxmlformats.org/drawingml/2006/main" xmlns:r="http://schemas.openxmlformats.org/officeDocument/2006/relationships" xmlns:p="http://schemas.openxmlformats.org/presentationml/2006/main">
   <p:cSld>
+    <p:bg>
+      <p:bgPr>
+        <a:solidFill>
+          <a:schemeClr val="tx1">
+            <a:lumMod val="95000"/>
+            <a:lumOff val="5000"/>
+          </a:schemeClr>
+        </a:solidFill>
+        <a:effectLst/>
+      </p:bgPr>
+    </p:bg>
     <p:spTree>
       <p:nvGrpSpPr>
         <p:cNvPr id="1" name="">
           <a:extLst>
             <a:ext uri="{FF2B5EF4-FFF2-40B4-BE49-F238E27FC236}">
-              <a16:creationId xmlns:a16="http://schemas.microsoft.com/office/drawing/2014/main" id="{BE4ACC97-52B2-D8E7-1836-BA13486FDA9D}"/>
+              <a16:creationId xmlns:a16="http://schemas.microsoft.com/office/drawing/2014/main" id="{884AD2E3-F83B-D8AD-E805-81FBE07D4320}"/>
             </a:ext>
           </a:extLst>
         </p:cNvPr>
@@ -6693,279 +6640,49 @@
           <p:cNvPr id="2" name="Title 1">
             <a:extLst>
               <a:ext uri="{FF2B5EF4-FFF2-40B4-BE49-F238E27FC236}">
-                <a16:creationId xmlns:a16="http://schemas.microsoft.com/office/drawing/2014/main" id="{86987403-720E-2EA9-62DC-CA57B427555F}"/>
-              </a:ext>
-            </a:extLst>
-          </p:cNvPr>
-          <p:cNvSpPr>
-            <a:spLocks noGrp="1"/>
-          </p:cNvSpPr>
-          <p:nvPr>
-            <p:ph type="title"/>
-          </p:nvPr>
-        </p:nvSpPr>
-        <p:spPr/>
+                <a16:creationId xmlns:a16="http://schemas.microsoft.com/office/drawing/2014/main" id="{9CD1D636-F0A9-F33F-40C0-4FF499D323A7}"/>
+              </a:ext>
+            </a:extLst>
+          </p:cNvPr>
+          <p:cNvSpPr>
+            <a:spLocks noGrp="1"/>
+          </p:cNvSpPr>
+          <p:nvPr>
+            <p:ph type="ctrTitle"/>
+          </p:nvPr>
+        </p:nvSpPr>
+        <p:spPr>
+          <a:xfrm>
+            <a:off x="1524000" y="3075781"/>
+            <a:ext cx="9144000" cy="706437"/>
+          </a:xfrm>
+        </p:spPr>
         <p:txBody>
           <a:bodyPr>
-            <a:normAutofit/>
+            <a:noAutofit/>
           </a:bodyPr>
           <a:lstStyle/>
           <a:p>
             <a:r>
-              <a:rPr lang="en-US" sz="2800" b="1" dirty="0"/>
-              <a:t>BBR dataset</a:t>
-            </a:r>
-            <a:endParaRPr lang="he-IL" sz="2800" dirty="0"/>
-          </a:p>
-        </p:txBody>
-      </p:sp>
-      <mc:AlternateContent xmlns:mc="http://schemas.openxmlformats.org/markup-compatibility/2006" xmlns:a14="http://schemas.microsoft.com/office/drawing/2010/main">
-        <mc:Choice Requires="a14">
-          <p:sp>
-            <p:nvSpPr>
-              <p:cNvPr id="3" name="Content Placeholder 2">
-                <a:extLst>
-                  <a:ext uri="{FF2B5EF4-FFF2-40B4-BE49-F238E27FC236}">
-                    <a16:creationId xmlns:a16="http://schemas.microsoft.com/office/drawing/2014/main" id="{D5FAC222-85F7-1524-0776-8220327D4F07}"/>
-                  </a:ext>
-                </a:extLst>
-              </p:cNvPr>
-              <p:cNvSpPr>
-                <a:spLocks noGrp="1"/>
-              </p:cNvSpPr>
-              <p:nvPr>
-                <p:ph idx="1"/>
-              </p:nvPr>
-            </p:nvSpPr>
-            <p:spPr>
-              <a:xfrm>
-                <a:off x="838200" y="1539186"/>
-                <a:ext cx="10515600" cy="4351338"/>
-              </a:xfrm>
-            </p:spPr>
-            <p:txBody>
-              <a:bodyPr/>
-              <a:lstStyle/>
-              <a:p>
-                <a:r>
-                  <a:rPr lang="en-US" dirty="0"/>
-                  <a:t>this dataset is internal BGU Biomedical Robotics (BBR) dataset.</a:t>
-                </a:r>
-              </a:p>
-              <a:p>
-                <a:r>
-                  <a:rPr lang="en-US" dirty="0"/>
-                  <a:t> 2 participants, an expert surgeon and student. 86 trials, include rotating plate.</a:t>
-                </a:r>
-              </a:p>
-              <a:p>
-                <a:r>
-                  <a:rPr lang="en-US" dirty="0"/>
-                  <a:t>The dataset consists of kinematic data sampled at 50Hz and manual annotations of gesture labels.</a:t>
-                </a:r>
-              </a:p>
-              <a:p>
-                <a:r>
-                  <a:rPr lang="en-US" dirty="0"/>
-                  <a:t>[</a:t>
-                </a:r>
-                <a14:m>
-                  <m:oMath xmlns:m="http://schemas.openxmlformats.org/officeDocument/2006/math">
-                    <m:r>
-                      <a:rPr lang="en-US" b="0" i="1" smtClean="0">
-                        <a:latin typeface="Cambria Math" panose="02040503050406030204" pitchFamily="18" charset="0"/>
-                      </a:rPr>
-                      <m:t>𝑥</m:t>
-                    </m:r>
-                    <m:r>
-                      <a:rPr lang="en-US" b="0" i="1" smtClean="0">
-                        <a:latin typeface="Cambria Math" panose="02040503050406030204" pitchFamily="18" charset="0"/>
-                      </a:rPr>
-                      <m:t>,</m:t>
-                    </m:r>
-                    <m:r>
-                      <a:rPr lang="en-US" b="0" i="1" smtClean="0">
-                        <a:latin typeface="Cambria Math" panose="02040503050406030204" pitchFamily="18" charset="0"/>
-                      </a:rPr>
-                      <m:t>𝑦</m:t>
-                    </m:r>
-                    <m:r>
-                      <a:rPr lang="en-US" b="0" i="1" smtClean="0">
-                        <a:latin typeface="Cambria Math" panose="02040503050406030204" pitchFamily="18" charset="0"/>
-                      </a:rPr>
-                      <m:t>,</m:t>
-                    </m:r>
-                    <m:r>
-                      <a:rPr lang="en-US" b="0" i="1" smtClean="0">
-                        <a:latin typeface="Cambria Math" panose="02040503050406030204" pitchFamily="18" charset="0"/>
-                      </a:rPr>
-                      <m:t>𝑧</m:t>
-                    </m:r>
-                    <m:r>
-                      <a:rPr lang="en-US" b="0" i="1" smtClean="0">
-                        <a:latin typeface="Cambria Math" panose="02040503050406030204" pitchFamily="18" charset="0"/>
-                      </a:rPr>
-                      <m:t>,</m:t>
-                    </m:r>
-                    <m:acc>
-                      <m:accPr>
-                        <m:chr m:val="̇"/>
-                        <m:ctrlPr>
-                          <a:rPr lang="en-US" b="0" i="1" smtClean="0">
-                            <a:latin typeface="Cambria Math" panose="02040503050406030204" pitchFamily="18" charset="0"/>
-                          </a:rPr>
-                        </m:ctrlPr>
-                      </m:accPr>
-                      <m:e>
-                        <m:r>
-                          <a:rPr lang="en-US" b="0" i="1" smtClean="0">
-                            <a:latin typeface="Cambria Math" panose="02040503050406030204" pitchFamily="18" charset="0"/>
-                          </a:rPr>
-                          <m:t>𝑥</m:t>
-                        </m:r>
-                      </m:e>
-                    </m:acc>
-                    <m:r>
-                      <a:rPr lang="en-US" b="0" i="1" smtClean="0">
-                        <a:latin typeface="Cambria Math" panose="02040503050406030204" pitchFamily="18" charset="0"/>
-                      </a:rPr>
-                      <m:t>,</m:t>
-                    </m:r>
-                    <m:acc>
-                      <m:accPr>
-                        <m:chr m:val="̇"/>
-                        <m:ctrlPr>
-                          <a:rPr lang="en-US" b="0" i="1" smtClean="0">
-                            <a:latin typeface="Cambria Math" panose="02040503050406030204" pitchFamily="18" charset="0"/>
-                          </a:rPr>
-                        </m:ctrlPr>
-                      </m:accPr>
-                      <m:e>
-                        <m:r>
-                          <a:rPr lang="en-US" b="0" i="1" smtClean="0">
-                            <a:latin typeface="Cambria Math" panose="02040503050406030204" pitchFamily="18" charset="0"/>
-                          </a:rPr>
-                          <m:t>𝑦</m:t>
-                        </m:r>
-                      </m:e>
-                    </m:acc>
-                    <m:r>
-                      <a:rPr lang="en-US" b="0" i="1" smtClean="0">
-                        <a:latin typeface="Cambria Math" panose="02040503050406030204" pitchFamily="18" charset="0"/>
-                      </a:rPr>
-                      <m:t>,</m:t>
-                    </m:r>
-                    <m:acc>
-                      <m:accPr>
-                        <m:chr m:val="̇"/>
-                        <m:ctrlPr>
-                          <a:rPr lang="en-US" b="0" i="1" smtClean="0">
-                            <a:latin typeface="Cambria Math" panose="02040503050406030204" pitchFamily="18" charset="0"/>
-                          </a:rPr>
-                        </m:ctrlPr>
-                      </m:accPr>
-                      <m:e>
-                        <m:r>
-                          <a:rPr lang="en-US" b="0" i="1" smtClean="0">
-                            <a:latin typeface="Cambria Math" panose="02040503050406030204" pitchFamily="18" charset="0"/>
-                          </a:rPr>
-                          <m:t>𝑧</m:t>
-                        </m:r>
-                      </m:e>
-                    </m:acc>
-                    <m:r>
-                      <a:rPr lang="en-US" b="0" i="1" smtClean="0">
-                        <a:latin typeface="Cambria Math" panose="02040503050406030204" pitchFamily="18" charset="0"/>
-                      </a:rPr>
-                      <m:t>,</m:t>
-                    </m:r>
-                    <m:sSub>
-                      <m:sSubPr>
-                        <m:ctrlPr>
-                          <a:rPr lang="en-US" b="0" i="1" smtClean="0">
-                            <a:latin typeface="Cambria Math" panose="02040503050406030204" pitchFamily="18" charset="0"/>
-                          </a:rPr>
-                        </m:ctrlPr>
-                      </m:sSubPr>
-                      <m:e>
-                        <m:r>
-                          <a:rPr lang="en-US" b="0" i="1" smtClean="0">
-                            <a:latin typeface="Cambria Math" panose="02040503050406030204" pitchFamily="18" charset="0"/>
-                            <a:ea typeface="Cambria Math" panose="02040503050406030204" pitchFamily="18" charset="0"/>
-                          </a:rPr>
-                          <m:t>𝜃</m:t>
-                        </m:r>
-                      </m:e>
-                      <m:sub>
-                        <m:r>
-                          <a:rPr lang="en-US" b="0" i="1" smtClean="0">
-                            <a:latin typeface="Cambria Math" panose="02040503050406030204" pitchFamily="18" charset="0"/>
-                          </a:rPr>
-                          <m:t>𝑔𝑟𝑖𝑝𝑝𝑒𝑟</m:t>
-                        </m:r>
-                      </m:sub>
-                    </m:sSub>
-                  </m:oMath>
-                </a14:m>
-                <a:r>
-                  <a:rPr lang="en-US" dirty="0"/>
-                  <a:t>] for both patients side manipulator (PSM) resulting 14 elements</a:t>
-                </a:r>
-              </a:p>
-              <a:p>
-                <a:endParaRPr lang="he-IL" dirty="0"/>
-              </a:p>
-            </p:txBody>
-          </p:sp>
-        </mc:Choice>
-        <mc:Fallback xmlns="">
-          <p:sp>
-            <p:nvSpPr>
-              <p:cNvPr id="3" name="Content Placeholder 2">
-                <a:extLst>
-                  <a:ext uri="{FF2B5EF4-FFF2-40B4-BE49-F238E27FC236}">
-                    <a16:creationId xmlns:a16="http://schemas.microsoft.com/office/drawing/2014/main" id="{D5FAC222-85F7-1524-0776-8220327D4F07}"/>
-                  </a:ext>
-                </a:extLst>
-              </p:cNvPr>
-              <p:cNvSpPr>
-                <a:spLocks noGrp="1" noRot="1" noChangeAspect="1" noMove="1" noResize="1" noEditPoints="1" noAdjustHandles="1" noChangeArrowheads="1" noChangeShapeType="1" noTextEdit="1"/>
-              </p:cNvSpPr>
-              <p:nvPr>
-                <p:ph idx="1"/>
-              </p:nvPr>
-            </p:nvSpPr>
-            <p:spPr>
-              <a:xfrm>
-                <a:off x="838200" y="1539186"/>
-                <a:ext cx="10515600" cy="4351338"/>
-              </a:xfrm>
-              <a:blipFill>
-                <a:blip r:embed="rId2"/>
-                <a:stretch>
-                  <a:fillRect l="-1043" t="-2381"/>
-                </a:stretch>
-              </a:blipFill>
-            </p:spPr>
-            <p:txBody>
-              <a:bodyPr/>
-              <a:lstStyle/>
-              <a:p>
-                <a:r>
-                  <a:rPr lang="he-IL">
-                    <a:noFill/>
-                  </a:rPr>
-                  <a:t> </a:t>
-                </a:r>
-              </a:p>
-            </p:txBody>
-          </p:sp>
-        </mc:Fallback>
-      </mc:AlternateContent>
+              <a:rPr lang="en-US" sz="5400" dirty="0">
+                <a:solidFill>
+                  <a:schemeClr val="bg1"/>
+                </a:solidFill>
+              </a:rPr>
+              <a:t>Model</a:t>
+            </a:r>
+            <a:endParaRPr lang="he-IL" sz="34400" dirty="0">
+              <a:solidFill>
+                <a:schemeClr val="bg1"/>
+              </a:solidFill>
+            </a:endParaRPr>
+          </a:p>
+        </p:txBody>
+      </p:sp>
     </p:spTree>
     <p:extLst>
       <p:ext uri="{BB962C8B-B14F-4D97-AF65-F5344CB8AC3E}">
-        <p14:creationId xmlns:p14="http://schemas.microsoft.com/office/powerpoint/2010/main" val="1554978005"/>
+        <p14:creationId xmlns:p14="http://schemas.microsoft.com/office/powerpoint/2010/main" val="1916833066"/>
       </p:ext>
     </p:extLst>
   </p:cSld>
@@ -6980,13 +6697,7 @@
   <p:cSld>
     <p:spTree>
       <p:nvGrpSpPr>
-        <p:cNvPr id="1" name="">
-          <a:extLst>
-            <a:ext uri="{FF2B5EF4-FFF2-40B4-BE49-F238E27FC236}">
-              <a16:creationId xmlns:a16="http://schemas.microsoft.com/office/drawing/2014/main" id="{AE72A6FD-F8B3-5592-D05A-C1F427FF404F}"/>
-            </a:ext>
-          </a:extLst>
-        </p:cNvPr>
+        <p:cNvPr id="1" name=""/>
         <p:cNvGrpSpPr/>
         <p:nvPr/>
       </p:nvGrpSpPr>
@@ -6998,513 +6709,40 @@
           <a:chExt cx="0" cy="0"/>
         </a:xfrm>
       </p:grpSpPr>
-      <p:sp>
-        <p:nvSpPr>
-          <p:cNvPr id="2" name="Title 1">
-            <a:extLst>
-              <a:ext uri="{FF2B5EF4-FFF2-40B4-BE49-F238E27FC236}">
-                <a16:creationId xmlns:a16="http://schemas.microsoft.com/office/drawing/2014/main" id="{FF795110-F516-14F9-2729-E77A9DB6FE92}"/>
-              </a:ext>
-            </a:extLst>
-          </p:cNvPr>
-          <p:cNvSpPr>
-            <a:spLocks noGrp="1"/>
-          </p:cNvSpPr>
-          <p:nvPr>
-            <p:ph type="title"/>
-          </p:nvPr>
-        </p:nvSpPr>
-        <p:spPr/>
-        <p:txBody>
-          <a:bodyPr>
-            <a:normAutofit/>
-          </a:bodyPr>
-          <a:lstStyle/>
-          <a:p>
-            <a:r>
-              <a:rPr lang="en-US" sz="2800" b="1" dirty="0"/>
-              <a:t>clinical-like dataset</a:t>
-            </a:r>
-            <a:endParaRPr lang="he-IL" dirty="0"/>
-          </a:p>
-        </p:txBody>
-      </p:sp>
-      <mc:AlternateContent xmlns:mc="http://schemas.openxmlformats.org/markup-compatibility/2006" xmlns:a14="http://schemas.microsoft.com/office/drawing/2010/main">
-        <mc:Choice Requires="a14">
-          <p:sp>
-            <p:nvSpPr>
-              <p:cNvPr id="3" name="Content Placeholder 2">
-                <a:extLst>
-                  <a:ext uri="{FF2B5EF4-FFF2-40B4-BE49-F238E27FC236}">
-                    <a16:creationId xmlns:a16="http://schemas.microsoft.com/office/drawing/2014/main" id="{CC1F39D8-6DB6-B94D-A0C8-FBA82A1D4256}"/>
-                  </a:ext>
-                </a:extLst>
-              </p:cNvPr>
-              <p:cNvSpPr>
-                <a:spLocks noGrp="1"/>
-              </p:cNvSpPr>
-              <p:nvPr>
-                <p:ph idx="1"/>
-              </p:nvPr>
-            </p:nvSpPr>
-            <p:spPr>
-              <a:xfrm>
-                <a:off x="838200" y="1594271"/>
-                <a:ext cx="10515600" cy="4351338"/>
-              </a:xfrm>
-            </p:spPr>
-            <p:txBody>
-              <a:bodyPr>
-                <a:normAutofit/>
-              </a:bodyPr>
-              <a:lstStyle/>
-              <a:p>
-                <a:r>
-                  <a:rPr lang="en-US" dirty="0"/>
-                  <a:t>6 surgeons, 1407 trials.</a:t>
-                </a:r>
-              </a:p>
-              <a:p>
-                <a:r>
-                  <a:rPr lang="en-US" dirty="0"/>
-                  <a:t> The dataset consists of the endpoint as well as joints’ angles kinematics.</a:t>
-                </a:r>
-              </a:p>
-              <a:p>
-                <a:r>
-                  <a:rPr lang="en-US" dirty="0"/>
-                  <a:t>sampled at 50 Hz, and video data. they used the video just to manually annotate each datapoint into gestures.</a:t>
-                </a:r>
-              </a:p>
-              <a:p>
-                <a:r>
-                  <a:rPr lang="en-US" dirty="0"/>
-                  <a:t>[</a:t>
-                </a:r>
-                <a14:m>
-                  <m:oMath xmlns:m="http://schemas.openxmlformats.org/officeDocument/2006/math">
-                    <m:r>
-                      <a:rPr lang="en-US" b="0" i="1" smtClean="0">
-                        <a:latin typeface="Cambria Math" panose="02040503050406030204" pitchFamily="18" charset="0"/>
-                      </a:rPr>
-                      <m:t>𝑥</m:t>
-                    </m:r>
-                    <m:r>
-                      <a:rPr lang="en-US" b="0" i="1" smtClean="0">
-                        <a:latin typeface="Cambria Math" panose="02040503050406030204" pitchFamily="18" charset="0"/>
-                      </a:rPr>
-                      <m:t>,</m:t>
-                    </m:r>
-                    <m:r>
-                      <a:rPr lang="en-US" b="0" i="1" smtClean="0">
-                        <a:latin typeface="Cambria Math" panose="02040503050406030204" pitchFamily="18" charset="0"/>
-                      </a:rPr>
-                      <m:t>𝑦</m:t>
-                    </m:r>
-                    <m:r>
-                      <a:rPr lang="en-US" b="0" i="1" smtClean="0">
-                        <a:latin typeface="Cambria Math" panose="02040503050406030204" pitchFamily="18" charset="0"/>
-                      </a:rPr>
-                      <m:t>,</m:t>
-                    </m:r>
-                    <m:r>
-                      <a:rPr lang="en-US" b="0" i="1" smtClean="0">
-                        <a:latin typeface="Cambria Math" panose="02040503050406030204" pitchFamily="18" charset="0"/>
-                      </a:rPr>
-                      <m:t>𝑧</m:t>
-                    </m:r>
-                    <m:r>
-                      <a:rPr lang="en-US" b="0" i="1" smtClean="0">
-                        <a:latin typeface="Cambria Math" panose="02040503050406030204" pitchFamily="18" charset="0"/>
-                      </a:rPr>
-                      <m:t>,</m:t>
-                    </m:r>
-                    <m:acc>
-                      <m:accPr>
-                        <m:chr m:val="̇"/>
-                        <m:ctrlPr>
-                          <a:rPr lang="en-US" b="0" i="1" smtClean="0">
-                            <a:latin typeface="Cambria Math" panose="02040503050406030204" pitchFamily="18" charset="0"/>
-                          </a:rPr>
-                        </m:ctrlPr>
-                      </m:accPr>
-                      <m:e>
-                        <m:r>
-                          <a:rPr lang="en-US" b="0" i="1" smtClean="0">
-                            <a:latin typeface="Cambria Math" panose="02040503050406030204" pitchFamily="18" charset="0"/>
-                          </a:rPr>
-                          <m:t>𝑥</m:t>
-                        </m:r>
-                      </m:e>
-                    </m:acc>
-                    <m:r>
-                      <a:rPr lang="en-US" b="0" i="1" smtClean="0">
-                        <a:latin typeface="Cambria Math" panose="02040503050406030204" pitchFamily="18" charset="0"/>
-                      </a:rPr>
-                      <m:t>,</m:t>
-                    </m:r>
-                    <m:acc>
-                      <m:accPr>
-                        <m:chr m:val="̇"/>
-                        <m:ctrlPr>
-                          <a:rPr lang="en-US" b="0" i="1" smtClean="0">
-                            <a:latin typeface="Cambria Math" panose="02040503050406030204" pitchFamily="18" charset="0"/>
-                          </a:rPr>
-                        </m:ctrlPr>
-                      </m:accPr>
-                      <m:e>
-                        <m:r>
-                          <a:rPr lang="en-US" b="0" i="1" smtClean="0">
-                            <a:latin typeface="Cambria Math" panose="02040503050406030204" pitchFamily="18" charset="0"/>
-                          </a:rPr>
-                          <m:t>𝑦</m:t>
-                        </m:r>
-                      </m:e>
-                    </m:acc>
-                    <m:r>
-                      <a:rPr lang="en-US" b="0" i="1" smtClean="0">
-                        <a:latin typeface="Cambria Math" panose="02040503050406030204" pitchFamily="18" charset="0"/>
-                      </a:rPr>
-                      <m:t>,</m:t>
-                    </m:r>
-                    <m:acc>
-                      <m:accPr>
-                        <m:chr m:val="̇"/>
-                        <m:ctrlPr>
-                          <a:rPr lang="en-US" b="0" i="1" smtClean="0">
-                            <a:latin typeface="Cambria Math" panose="02040503050406030204" pitchFamily="18" charset="0"/>
-                          </a:rPr>
-                        </m:ctrlPr>
-                      </m:accPr>
-                      <m:e>
-                        <m:r>
-                          <a:rPr lang="en-US" b="0" i="1" smtClean="0">
-                            <a:latin typeface="Cambria Math" panose="02040503050406030204" pitchFamily="18" charset="0"/>
-                          </a:rPr>
-                          <m:t>𝑧</m:t>
-                        </m:r>
-                      </m:e>
-                    </m:acc>
-                    <m:r>
-                      <a:rPr lang="en-US" b="0" i="1" smtClean="0">
-                        <a:latin typeface="Cambria Math" panose="02040503050406030204" pitchFamily="18" charset="0"/>
-                      </a:rPr>
-                      <m:t>,</m:t>
-                    </m:r>
-                    <m:sSub>
-                      <m:sSubPr>
-                        <m:ctrlPr>
-                          <a:rPr lang="en-US" b="0" i="1" smtClean="0">
-                            <a:latin typeface="Cambria Math" panose="02040503050406030204" pitchFamily="18" charset="0"/>
-                          </a:rPr>
-                        </m:ctrlPr>
-                      </m:sSubPr>
-                      <m:e>
-                        <m:r>
-                          <a:rPr lang="en-US" b="0" i="1" smtClean="0">
-                            <a:latin typeface="Cambria Math" panose="02040503050406030204" pitchFamily="18" charset="0"/>
-                            <a:ea typeface="Cambria Math" panose="02040503050406030204" pitchFamily="18" charset="0"/>
-                          </a:rPr>
-                          <m:t>𝜃</m:t>
-                        </m:r>
-                      </m:e>
-                      <m:sub>
-                        <m:r>
-                          <a:rPr lang="en-US" b="0" i="1" smtClean="0">
-                            <a:latin typeface="Cambria Math" panose="02040503050406030204" pitchFamily="18" charset="0"/>
-                          </a:rPr>
-                          <m:t>𝑔𝑟𝑖𝑝𝑝𝑒𝑟</m:t>
-                        </m:r>
-                      </m:sub>
-                    </m:sSub>
-                  </m:oMath>
-                </a14:m>
-                <a:r>
-                  <a:rPr lang="en-US" dirty="0"/>
-                  <a:t>] for both patients side manipulator (PSM) resulting 14 elements </a:t>
-                </a:r>
-              </a:p>
-              <a:p>
-                <a14:m>
-                  <m:oMath xmlns:m="http://schemas.openxmlformats.org/officeDocument/2006/math">
-                    <m:r>
-                      <a:rPr lang="en-US" b="0" i="1" smtClean="0">
-                        <a:latin typeface="Cambria Math" panose="02040503050406030204" pitchFamily="18" charset="0"/>
-                      </a:rPr>
-                      <m:t>[</m:t>
-                    </m:r>
-                    <m:sSub>
-                      <m:sSubPr>
-                        <m:ctrlPr>
-                          <a:rPr lang="en-US" b="0" i="1" smtClean="0">
-                            <a:latin typeface="Cambria Math" panose="02040503050406030204" pitchFamily="18" charset="0"/>
-                          </a:rPr>
-                        </m:ctrlPr>
-                      </m:sSubPr>
-                      <m:e>
-                        <m:r>
-                          <a:rPr lang="en-US" b="0" i="1" smtClean="0">
-                            <a:latin typeface="Cambria Math" panose="02040503050406030204" pitchFamily="18" charset="0"/>
-                          </a:rPr>
-                          <m:t>𝑞</m:t>
-                        </m:r>
-                      </m:e>
-                      <m:sub>
-                        <m:r>
-                          <a:rPr lang="en-US" b="0" i="1" smtClean="0">
-                            <a:latin typeface="Cambria Math" panose="02040503050406030204" pitchFamily="18" charset="0"/>
-                          </a:rPr>
-                          <m:t>𝑖</m:t>
-                        </m:r>
-                        <m:r>
-                          <a:rPr lang="en-US" b="0" i="1" smtClean="0">
-                            <a:latin typeface="Cambria Math" panose="02040503050406030204" pitchFamily="18" charset="0"/>
-                          </a:rPr>
-                          <m:t>−</m:t>
-                        </m:r>
-                        <m:r>
-                          <a:rPr lang="en-US" b="0" i="1" smtClean="0">
-                            <a:latin typeface="Cambria Math" panose="02040503050406030204" pitchFamily="18" charset="0"/>
-                          </a:rPr>
-                          <m:t>𝑟𝑖𝑔</m:t>
-                        </m:r>
-                        <m:r>
-                          <a:rPr lang="en-US" b="0" i="1" smtClean="0">
-                            <a:latin typeface="Cambria Math" panose="02040503050406030204" pitchFamily="18" charset="0"/>
-                          </a:rPr>
-                          <m:t>h</m:t>
-                        </m:r>
-                        <m:r>
-                          <a:rPr lang="en-US" b="0" i="1" smtClean="0">
-                            <a:latin typeface="Cambria Math" panose="02040503050406030204" pitchFamily="18" charset="0"/>
-                          </a:rPr>
-                          <m:t>𝑡</m:t>
-                        </m:r>
-                        <m:r>
-                          <a:rPr lang="en-US" b="0" i="1" smtClean="0">
-                            <a:latin typeface="Cambria Math" panose="02040503050406030204" pitchFamily="18" charset="0"/>
-                          </a:rPr>
-                          <m:t>_</m:t>
-                        </m:r>
-                        <m:r>
-                          <a:rPr lang="en-US" b="0" i="1" smtClean="0">
-                            <a:latin typeface="Cambria Math" panose="02040503050406030204" pitchFamily="18" charset="0"/>
-                          </a:rPr>
-                          <m:t>𝑃𝑆𝑀</m:t>
-                        </m:r>
-                      </m:sub>
-                    </m:sSub>
-                    <m:r>
-                      <a:rPr lang="en-US" b="0" i="1" smtClean="0">
-                        <a:latin typeface="Cambria Math" panose="02040503050406030204" pitchFamily="18" charset="0"/>
-                      </a:rPr>
-                      <m:t>,</m:t>
-                    </m:r>
-                    <m:sSub>
-                      <m:sSubPr>
-                        <m:ctrlPr>
-                          <a:rPr lang="en-US" b="0" i="1" smtClean="0">
-                            <a:latin typeface="Cambria Math" panose="02040503050406030204" pitchFamily="18" charset="0"/>
-                          </a:rPr>
-                        </m:ctrlPr>
-                      </m:sSubPr>
-                      <m:e>
-                        <m:r>
-                          <a:rPr lang="en-US" b="0" i="1" smtClean="0">
-                            <a:latin typeface="Cambria Math" panose="02040503050406030204" pitchFamily="18" charset="0"/>
-                          </a:rPr>
-                          <m:t>𝑞</m:t>
-                        </m:r>
-                      </m:e>
-                      <m:sub>
-                        <m:r>
-                          <a:rPr lang="en-US" b="0" i="1" smtClean="0">
-                            <a:latin typeface="Cambria Math" panose="02040503050406030204" pitchFamily="18" charset="0"/>
-                          </a:rPr>
-                          <m:t>𝑖</m:t>
-                        </m:r>
-                        <m:r>
-                          <a:rPr lang="en-US" b="0" i="1" smtClean="0">
-                            <a:latin typeface="Cambria Math" panose="02040503050406030204" pitchFamily="18" charset="0"/>
-                          </a:rPr>
-                          <m:t>−</m:t>
-                        </m:r>
-                        <m:r>
-                          <a:rPr lang="en-US" b="0" i="1" smtClean="0">
-                            <a:latin typeface="Cambria Math" panose="02040503050406030204" pitchFamily="18" charset="0"/>
-                          </a:rPr>
-                          <m:t>𝑙𝑒𝑓𝑡</m:t>
-                        </m:r>
-                        <m:r>
-                          <a:rPr lang="en-US" b="0" i="1" smtClean="0">
-                            <a:latin typeface="Cambria Math" panose="02040503050406030204" pitchFamily="18" charset="0"/>
-                          </a:rPr>
-                          <m:t>_</m:t>
-                        </m:r>
-                        <m:r>
-                          <a:rPr lang="en-US" b="0" i="1" smtClean="0">
-                            <a:latin typeface="Cambria Math" panose="02040503050406030204" pitchFamily="18" charset="0"/>
-                          </a:rPr>
-                          <m:t>𝑃𝑆𝑀</m:t>
-                        </m:r>
-                      </m:sub>
-                    </m:sSub>
-                    <m:r>
-                      <a:rPr lang="en-US" b="0" i="1" smtClean="0">
-                        <a:latin typeface="Cambria Math" panose="02040503050406030204" pitchFamily="18" charset="0"/>
-                      </a:rPr>
-                      <m:t>]</m:t>
-                    </m:r>
-                  </m:oMath>
-                </a14:m>
-                <a:r>
-                  <a:rPr lang="en-US" dirty="0"/>
-                  <a:t> </a:t>
-                </a:r>
-                <a:r>
-                  <a:rPr lang="en-US" dirty="0" err="1"/>
-                  <a:t>i</a:t>
-                </a:r>
-                <a:r>
-                  <a:rPr lang="en-US" dirty="0"/>
-                  <a:t> = 1:6 . </a:t>
-                </a:r>
-                <a14:m>
-                  <m:oMath xmlns:m="http://schemas.openxmlformats.org/officeDocument/2006/math">
-                    <m:sSub>
-                      <m:sSubPr>
-                        <m:ctrlPr>
-                          <a:rPr lang="en-US" b="0" i="1" smtClean="0">
-                            <a:latin typeface="Cambria Math" panose="02040503050406030204" pitchFamily="18" charset="0"/>
-                          </a:rPr>
-                        </m:ctrlPr>
-                      </m:sSubPr>
-                      <m:e>
-                        <m:r>
-                          <a:rPr lang="en-US" b="0" i="1" smtClean="0">
-                            <a:latin typeface="Cambria Math" panose="02040503050406030204" pitchFamily="18" charset="0"/>
-                          </a:rPr>
-                          <m:t>𝑞</m:t>
-                        </m:r>
-                      </m:e>
-                      <m:sub>
-                        <m:r>
-                          <a:rPr lang="en-US" b="0" i="1" smtClean="0">
-                            <a:latin typeface="Cambria Math" panose="02040503050406030204" pitchFamily="18" charset="0"/>
-                          </a:rPr>
-                          <m:t>𝑖</m:t>
-                        </m:r>
-                      </m:sub>
-                    </m:sSub>
-                    <m:r>
-                      <a:rPr lang="en-US" b="0" i="0" smtClean="0">
-                        <a:latin typeface="Cambria Math" panose="02040503050406030204" pitchFamily="18" charset="0"/>
-                      </a:rPr>
-                      <m:t>=</m:t>
-                    </m:r>
-                    <m:r>
-                      <m:rPr>
-                        <m:sty m:val="p"/>
-                      </m:rPr>
-                      <a:rPr lang="en-US" b="0" i="0" smtClean="0">
-                        <a:latin typeface="Cambria Math" panose="02040503050406030204" pitchFamily="18" charset="0"/>
-                      </a:rPr>
-                      <m:t>PSM</m:t>
-                    </m:r>
-                    <m:r>
-                      <a:rPr lang="en-US" b="0" i="0" smtClean="0">
-                        <a:latin typeface="Cambria Math" panose="02040503050406030204" pitchFamily="18" charset="0"/>
-                      </a:rPr>
-                      <m:t> </m:t>
-                    </m:r>
-                    <m:r>
-                      <m:rPr>
-                        <m:sty m:val="p"/>
-                      </m:rPr>
-                      <a:rPr lang="en-US" b="0" i="0" smtClean="0">
-                        <a:latin typeface="Cambria Math" panose="02040503050406030204" pitchFamily="18" charset="0"/>
-                      </a:rPr>
-                      <m:t>joints</m:t>
-                    </m:r>
-                    <m:r>
-                      <a:rPr lang="en-US" b="0" i="0" smtClean="0">
-                        <a:latin typeface="Cambria Math" panose="02040503050406030204" pitchFamily="18" charset="0"/>
-                      </a:rPr>
-                      <m:t> </m:t>
-                    </m:r>
-                    <m:r>
-                      <m:rPr>
-                        <m:sty m:val="p"/>
-                      </m:rPr>
-                      <a:rPr lang="en-US" b="0" i="0" smtClean="0">
-                        <a:latin typeface="Cambria Math" panose="02040503050406030204" pitchFamily="18" charset="0"/>
-                      </a:rPr>
-                      <m:t>angles</m:t>
-                    </m:r>
-                  </m:oMath>
-                </a14:m>
-                <a:endParaRPr lang="en-US" b="0" dirty="0"/>
-              </a:p>
-              <a:p>
-                <a:r>
-                  <a:rPr lang="en-US" dirty="0"/>
-                  <a:t>Resulting 26 elements.</a:t>
-                </a:r>
-              </a:p>
-              <a:p>
-                <a:endParaRPr lang="he-IL" dirty="0"/>
-              </a:p>
-            </p:txBody>
-          </p:sp>
-        </mc:Choice>
-        <mc:Fallback xmlns="">
-          <p:sp>
-            <p:nvSpPr>
-              <p:cNvPr id="3" name="Content Placeholder 2">
-                <a:extLst>
-                  <a:ext uri="{FF2B5EF4-FFF2-40B4-BE49-F238E27FC236}">
-                    <a16:creationId xmlns:a16="http://schemas.microsoft.com/office/drawing/2014/main" id="{CC1F39D8-6DB6-B94D-A0C8-FBA82A1D4256}"/>
-                  </a:ext>
-                </a:extLst>
-              </p:cNvPr>
-              <p:cNvSpPr>
-                <a:spLocks noGrp="1" noRot="1" noChangeAspect="1" noMove="1" noResize="1" noEditPoints="1" noAdjustHandles="1" noChangeArrowheads="1" noChangeShapeType="1" noTextEdit="1"/>
-              </p:cNvSpPr>
-              <p:nvPr>
-                <p:ph idx="1"/>
-              </p:nvPr>
-            </p:nvSpPr>
-            <p:spPr>
-              <a:xfrm>
-                <a:off x="838200" y="1594271"/>
-                <a:ext cx="10515600" cy="4351338"/>
-              </a:xfrm>
-              <a:blipFill>
-                <a:blip r:embed="rId2"/>
-                <a:stretch>
-                  <a:fillRect l="-1043" t="-2525" b="-1683"/>
-                </a:stretch>
-              </a:blipFill>
-            </p:spPr>
-            <p:txBody>
-              <a:bodyPr/>
-              <a:lstStyle/>
-              <a:p>
-                <a:r>
-                  <a:rPr lang="he-IL">
-                    <a:noFill/>
-                  </a:rPr>
-                  <a:t> </a:t>
-                </a:r>
-              </a:p>
-            </p:txBody>
-          </p:sp>
-        </mc:Fallback>
-      </mc:AlternateContent>
+      <p:pic>
+        <p:nvPicPr>
+          <p:cNvPr id="4" name="Picture 3">
+            <a:extLst>
+              <a:ext uri="{FF2B5EF4-FFF2-40B4-BE49-F238E27FC236}">
+                <a16:creationId xmlns:a16="http://schemas.microsoft.com/office/drawing/2014/main" id="{9B09861D-FF73-DFDA-BAC5-CAB5EDA9E854}"/>
+              </a:ext>
+            </a:extLst>
+          </p:cNvPr>
+          <p:cNvPicPr>
+            <a:picLocks noChangeAspect="1"/>
+          </p:cNvPicPr>
+          <p:nvPr/>
+        </p:nvPicPr>
+        <p:blipFill>
+          <a:blip r:embed="rId2"/>
+          <a:stretch>
+            <a:fillRect/>
+          </a:stretch>
+        </p:blipFill>
+        <p:spPr>
+          <a:xfrm>
+            <a:off x="572036" y="1582676"/>
+            <a:ext cx="10859565" cy="3000340"/>
+          </a:xfrm>
+          <a:prstGeom prst="rect">
+            <a:avLst/>
+          </a:prstGeom>
+        </p:spPr>
+      </p:pic>
     </p:spTree>
     <p:extLst>
       <p:ext uri="{BB962C8B-B14F-4D97-AF65-F5344CB8AC3E}">
-        <p14:creationId xmlns:p14="http://schemas.microsoft.com/office/powerpoint/2010/main" val="1011640921"/>
+        <p14:creationId xmlns:p14="http://schemas.microsoft.com/office/powerpoint/2010/main" val="2364506096"/>
       </p:ext>
     </p:extLst>
   </p:cSld>

</xml_diff>